<commit_message>
Add activity files for problem/hypothesis statement
</commit_message>
<xml_diff>
--- a/02-ux-design-process/week1/Porfolio-project1-persona/Porfolio-Project-Persona.pptx
+++ b/02-ux-design-process/week1/Porfolio-project1-persona/Porfolio-Project-Persona.pptx
@@ -45,7 +45,7 @@
         <p:txBody>
           <a:bodyPr/>
           <a:p>
-            <a:fld id="{6E0C3BF4-5706-4153-BEB6-A13B0656E07B}" type="slidenum">
+            <a:fld id="{D3F37F4A-89AC-4513-917F-DE77A4082358}" type="slidenum">
               <a:t>&lt;#&gt;</a:t>
             </a:fld>
           </a:p>
@@ -213,7 +213,7 @@
         <p:txBody>
           <a:bodyPr/>
           <a:p>
-            <a:fld id="{C0978F5E-3268-479A-8447-265F57FB2E36}" type="slidenum">
+            <a:fld id="{B5030E03-438A-458B-9B22-DE87205217BE}" type="slidenum">
               <a:t>&lt;#&gt;</a:t>
             </a:fld>
           </a:p>
@@ -467,7 +467,7 @@
         <p:txBody>
           <a:bodyPr/>
           <a:p>
-            <a:fld id="{4FA7BB5D-9E2E-4700-9778-449BEAAD8C53}" type="slidenum">
+            <a:fld id="{7C86CC23-7E26-47F7-9739-61FD1F171544}" type="slidenum">
               <a:t>&lt;#&gt;</a:t>
             </a:fld>
           </a:p>
@@ -807,7 +807,7 @@
         <p:txBody>
           <a:bodyPr/>
           <a:p>
-            <a:fld id="{7CD978E6-2E5D-436A-8A3D-5F460A2245D9}" type="slidenum">
+            <a:fld id="{A8662A38-6F3D-4CCB-8C64-69706B6DA8A9}" type="slidenum">
               <a:t>&lt;#&gt;</a:t>
             </a:fld>
           </a:p>
@@ -849,7 +849,7 @@
         <p:txBody>
           <a:bodyPr/>
           <a:p>
-            <a:fld id="{A7327D2E-1262-42D0-ABC3-6C6323186DCC}" type="slidenum">
+            <a:fld id="{F6B6331D-1D76-42F4-9EA0-197556AC714E}" type="slidenum">
               <a:t>&lt;#&gt;</a:t>
             </a:fld>
           </a:p>
@@ -971,7 +971,7 @@
         <p:txBody>
           <a:bodyPr/>
           <a:p>
-            <a:fld id="{8C930DF9-91C4-431A-9D6D-22163392C53D}" type="slidenum">
+            <a:fld id="{07BAB186-F5EA-4C8C-8D83-804A5F051827}" type="slidenum">
               <a:t>&lt;#&gt;</a:t>
             </a:fld>
           </a:p>
@@ -1096,7 +1096,7 @@
         <p:txBody>
           <a:bodyPr/>
           <a:p>
-            <a:fld id="{535056BC-B159-4205-B23E-527FE5BFCFEE}" type="slidenum">
+            <a:fld id="{8472B923-7611-40D4-A771-8C159092BDDE}" type="slidenum">
               <a:t>&lt;#&gt;</a:t>
             </a:fld>
           </a:p>
@@ -1264,7 +1264,7 @@
         <p:txBody>
           <a:bodyPr/>
           <a:p>
-            <a:fld id="{36D56FCF-8122-429B-B7BA-BA2190F0FD28}" type="slidenum">
+            <a:fld id="{7E3B6446-46CA-4A38-A43E-4D86C805CC7C}" type="slidenum">
               <a:t>&lt;#&gt;</a:t>
             </a:fld>
           </a:p>
@@ -1346,7 +1346,7 @@
         <p:txBody>
           <a:bodyPr/>
           <a:p>
-            <a:fld id="{76D52397-81E8-4BC8-9E1B-B614E8E5D447}" type="slidenum">
+            <a:fld id="{AAAE690E-C7F6-490F-A160-AE8446092069}" type="slidenum">
               <a:t>&lt;#&gt;</a:t>
             </a:fld>
           </a:p>
@@ -1426,7 +1426,7 @@
         <p:txBody>
           <a:bodyPr/>
           <a:p>
-            <a:fld id="{CB5AF7D4-2B2F-43C8-9802-1654A49FC93C}" type="slidenum">
+            <a:fld id="{05D7577E-38C2-42F3-8B36-BA907DC5B670}" type="slidenum">
               <a:t>&lt;#&gt;</a:t>
             </a:fld>
           </a:p>
@@ -1637,7 +1637,7 @@
         <p:txBody>
           <a:bodyPr/>
           <a:p>
-            <a:fld id="{7881B5D9-7ED2-45FE-881F-A593C07E9A00}" type="slidenum">
+            <a:fld id="{A2705524-4C3D-4338-9616-201F8F22AAE3}" type="slidenum">
               <a:t>&lt;#&gt;</a:t>
             </a:fld>
           </a:p>
@@ -1759,7 +1759,7 @@
         <p:txBody>
           <a:bodyPr/>
           <a:p>
-            <a:fld id="{964743EA-C8A0-4A16-954D-4DEC666428DF}" type="slidenum">
+            <a:fld id="{EF396A5D-A2B6-424E-8CCA-0AAB4FD9C64B}" type="slidenum">
               <a:t>&lt;#&gt;</a:t>
             </a:fld>
           </a:p>
@@ -1970,7 +1970,7 @@
         <p:txBody>
           <a:bodyPr/>
           <a:p>
-            <a:fld id="{1DA9EC56-3260-4894-AAEB-9A0BBE510597}" type="slidenum">
+            <a:fld id="{51927637-8D3B-4875-9FB9-FF84068D38D0}" type="slidenum">
               <a:t>&lt;#&gt;</a:t>
             </a:fld>
           </a:p>
@@ -2181,7 +2181,7 @@
         <p:txBody>
           <a:bodyPr/>
           <a:p>
-            <a:fld id="{EDF8AEFE-9EC9-4816-B214-B21CF7C12C6B}" type="slidenum">
+            <a:fld id="{7DA4B7A5-4204-4FF6-AF01-B879CBBF8624}" type="slidenum">
               <a:t>&lt;#&gt;</a:t>
             </a:fld>
           </a:p>
@@ -2349,7 +2349,7 @@
         <p:txBody>
           <a:bodyPr/>
           <a:p>
-            <a:fld id="{2B1427F8-F2F3-44E6-95AD-ED78A3ED04CB}" type="slidenum">
+            <a:fld id="{4FBFDE68-805A-46ED-8552-C2D700B96F8A}" type="slidenum">
               <a:t>&lt;#&gt;</a:t>
             </a:fld>
           </a:p>
@@ -2603,7 +2603,7 @@
         <p:txBody>
           <a:bodyPr/>
           <a:p>
-            <a:fld id="{779D25D2-A030-48E0-A46D-B076F19C5D65}" type="slidenum">
+            <a:fld id="{F70C07EB-425A-4E65-AF4D-5818412D0206}" type="slidenum">
               <a:t>&lt;#&gt;</a:t>
             </a:fld>
           </a:p>
@@ -2943,7 +2943,7 @@
         <p:txBody>
           <a:bodyPr/>
           <a:p>
-            <a:fld id="{FF625C11-F419-49D0-B1AA-72325A16E3F6}" type="slidenum">
+            <a:fld id="{A3FD8070-38F8-4C9F-9958-0ED44FC8AE4D}" type="slidenum">
               <a:t>&lt;#&gt;</a:t>
             </a:fld>
           </a:p>
@@ -3068,7 +3068,7 @@
         <p:txBody>
           <a:bodyPr/>
           <a:p>
-            <a:fld id="{B8346A8D-2F71-4AD0-B355-D3BD6693BFC3}" type="slidenum">
+            <a:fld id="{BAFA9DAD-B114-4358-8C17-A6591E101AE7}" type="slidenum">
               <a:t>&lt;#&gt;</a:t>
             </a:fld>
           </a:p>
@@ -3236,7 +3236,7 @@
         <p:txBody>
           <a:bodyPr/>
           <a:p>
-            <a:fld id="{69E97D09-7E41-4281-9CDB-22D351659541}" type="slidenum">
+            <a:fld id="{D445C7F8-C736-45FF-A24F-E631425A0DCB}" type="slidenum">
               <a:t>&lt;#&gt;</a:t>
             </a:fld>
           </a:p>
@@ -3318,7 +3318,7 @@
         <p:txBody>
           <a:bodyPr/>
           <a:p>
-            <a:fld id="{B7DFC364-C689-4E7D-AEF9-CBA002A06F74}" type="slidenum">
+            <a:fld id="{B16CABA6-CA45-405A-AEDA-938343C8B9CF}" type="slidenum">
               <a:t>&lt;#&gt;</a:t>
             </a:fld>
           </a:p>
@@ -3398,7 +3398,7 @@
         <p:txBody>
           <a:bodyPr/>
           <a:p>
-            <a:fld id="{AA65F0AE-1C45-4CF3-970A-C68D61B47563}" type="slidenum">
+            <a:fld id="{D4E099A1-3813-46E4-95C8-C1FCA2F3C207}" type="slidenum">
               <a:t>&lt;#&gt;</a:t>
             </a:fld>
           </a:p>
@@ -3609,7 +3609,7 @@
         <p:txBody>
           <a:bodyPr/>
           <a:p>
-            <a:fld id="{C07E24F4-306E-46A7-8F2D-A771E6286248}" type="slidenum">
+            <a:fld id="{27801D70-6206-42A5-A870-C777B72ACDAB}" type="slidenum">
               <a:t>&lt;#&gt;</a:t>
             </a:fld>
           </a:p>
@@ -3820,7 +3820,7 @@
         <p:txBody>
           <a:bodyPr/>
           <a:p>
-            <a:fld id="{69447566-E505-4FFC-9B94-65BA482ADF5C}" type="slidenum">
+            <a:fld id="{F5F3866E-5312-4D3D-834F-C58ED519B88B}" type="slidenum">
               <a:t>&lt;#&gt;</a:t>
             </a:fld>
           </a:p>
@@ -4031,7 +4031,7 @@
         <p:txBody>
           <a:bodyPr/>
           <a:p>
-            <a:fld id="{FDD4AF12-7C6C-4F87-96EC-D1243DEC8B25}" type="slidenum">
+            <a:fld id="{3D6234A8-A7C7-4373-8959-55E81B10F7D3}" type="slidenum">
               <a:t>&lt;#&gt;</a:t>
             </a:fld>
           </a:p>
@@ -4079,7 +4079,7 @@
         <p:spPr>
           <a:xfrm>
             <a:off x="8472600" y="4663080"/>
-            <a:ext cx="546840" cy="391680"/>
+            <a:ext cx="546480" cy="391320"/>
           </a:xfrm>
           <a:prstGeom prst="rect">
             <a:avLst/>
@@ -4121,7 +4121,7 @@
                 <a:tab algn="l" pos="0"/>
               </a:tabLst>
             </a:pPr>
-            <a:fld id="{3BE4B562-E746-4251-99E0-50531D66BFB1}" type="slidenum">
+            <a:fld id="{34892EFC-5B36-4953-975F-0A71A0EE92A9}" type="slidenum">
               <a:rPr b="0" lang="en" sz="1000" spc="-1" strike="noStrike">
                 <a:solidFill>
                   <a:schemeClr val="dk2"/>
@@ -4129,7 +4129,7 @@
                 <a:latin typeface="Arial"/>
                 <a:ea typeface="Arial"/>
               </a:rPr>
-              <a:t>&lt;number&gt;</a:t>
+              <a:t>2</a:t>
             </a:fld>
             <a:endParaRPr b="0" lang="en-US" sz="1000" spc="-1" strike="noStrike">
               <a:solidFill>
@@ -4471,7 +4471,7 @@
         <p:spPr>
           <a:xfrm>
             <a:off x="8472600" y="4663080"/>
-            <a:ext cx="546840" cy="391680"/>
+            <a:ext cx="546480" cy="391320"/>
           </a:xfrm>
           <a:prstGeom prst="rect">
             <a:avLst/>
@@ -4513,7 +4513,7 @@
                 <a:tab algn="l" pos="0"/>
               </a:tabLst>
             </a:pPr>
-            <a:fld id="{34526F66-EFB2-4AED-AA3F-9B07F833D49E}" type="slidenum">
+            <a:fld id="{6CDBB048-8503-4023-99A8-91B8AA1A7928}" type="slidenum">
               <a:rPr b="0" lang="en" sz="1000" spc="-1" strike="noStrike">
                 <a:solidFill>
                   <a:schemeClr val="dk2"/>
@@ -4521,7 +4521,7 @@
                 <a:latin typeface="Arial"/>
                 <a:ea typeface="Arial"/>
               </a:rPr>
-              <a:t>&lt;number&gt;</a:t>
+              <a:t>2</a:t>
             </a:fld>
             <a:endParaRPr b="0" lang="en-US" sz="1000" spc="-1" strike="noStrike">
               <a:solidFill>
@@ -4852,7 +4852,7 @@
         <p:spPr>
           <a:xfrm>
             <a:off x="451440" y="461160"/>
-            <a:ext cx="2756520" cy="2756520"/>
+            <a:ext cx="2756160" cy="2756160"/>
           </a:xfrm>
           <a:prstGeom prst="rect">
             <a:avLst/>
@@ -4905,7 +4905,7 @@
         <p:spPr>
           <a:xfrm>
             <a:off x="451440" y="3219480"/>
-            <a:ext cx="2756520" cy="469080"/>
+            <a:ext cx="2756160" cy="468720"/>
           </a:xfrm>
           <a:prstGeom prst="rect">
             <a:avLst/>
@@ -4962,7 +4962,7 @@
         <p:spPr>
           <a:xfrm>
             <a:off x="324000" y="3614400"/>
-            <a:ext cx="3103560" cy="1215360"/>
+            <a:ext cx="3103200" cy="1215000"/>
           </a:xfrm>
           <a:prstGeom prst="rect">
             <a:avLst/>
@@ -5189,7 +5189,7 @@
         <p:spPr>
           <a:xfrm>
             <a:off x="1707840" y="3614400"/>
-            <a:ext cx="1815480" cy="1215360"/>
+            <a:ext cx="1815120" cy="1215000"/>
           </a:xfrm>
           <a:prstGeom prst="rect">
             <a:avLst/>
@@ -5284,7 +5284,7 @@
         <p:spPr>
           <a:xfrm>
             <a:off x="3651480" y="461160"/>
-            <a:ext cx="5033880" cy="906840"/>
+            <a:ext cx="5033520" cy="906480"/>
           </a:xfrm>
           <a:prstGeom prst="rect">
             <a:avLst/>
@@ -5351,7 +5351,7 @@
         <p:spPr>
           <a:xfrm>
             <a:off x="3651480" y="1491840"/>
-            <a:ext cx="2521080" cy="1932120"/>
+            <a:ext cx="2520720" cy="1931760"/>
           </a:xfrm>
           <a:prstGeom prst="rect">
             <a:avLst/>
@@ -5511,7 +5511,7 @@
         <p:spPr>
           <a:xfrm>
             <a:off x="6326640" y="1491840"/>
-            <a:ext cx="2521080" cy="1932120"/>
+            <a:ext cx="2520720" cy="1931760"/>
           </a:xfrm>
           <a:prstGeom prst="rect">
             <a:avLst/>
@@ -5656,7 +5656,7 @@
         <p:spPr>
           <a:xfrm>
             <a:off x="3651480" y="3619800"/>
-            <a:ext cx="5195880" cy="1240560"/>
+            <a:ext cx="5195520" cy="1240200"/>
           </a:xfrm>
           <a:prstGeom prst="rect">
             <a:avLst/>
@@ -5716,7 +5716,7 @@
         <p:spPr>
           <a:xfrm>
             <a:off x="985320" y="1442160"/>
-            <a:ext cx="1664280" cy="794880"/>
+            <a:ext cx="1663920" cy="794520"/>
           </a:xfrm>
           <a:prstGeom prst="rect">
             <a:avLst/>
@@ -5777,7 +5777,7 @@
         <p:spPr>
           <a:xfrm>
             <a:off x="914400" y="555120"/>
-            <a:ext cx="1827360" cy="2590560"/>
+            <a:ext cx="1827000" cy="2590200"/>
           </a:xfrm>
           <a:prstGeom prst="rect">
             <a:avLst/>
@@ -5826,7 +5826,7 @@
         <p:spPr>
           <a:xfrm>
             <a:off x="451440" y="461160"/>
-            <a:ext cx="2756520" cy="2756520"/>
+            <a:ext cx="2756160" cy="2756160"/>
           </a:xfrm>
           <a:prstGeom prst="rect">
             <a:avLst/>
@@ -5876,7 +5876,7 @@
         <p:spPr>
           <a:xfrm>
             <a:off x="451440" y="3219480"/>
-            <a:ext cx="2756520" cy="469080"/>
+            <a:ext cx="2756160" cy="468720"/>
           </a:xfrm>
           <a:prstGeom prst="rect">
             <a:avLst/>
@@ -5933,7 +5933,7 @@
         <p:spPr>
           <a:xfrm>
             <a:off x="324000" y="3614400"/>
-            <a:ext cx="3103560" cy="1215360"/>
+            <a:ext cx="3103200" cy="1215000"/>
           </a:xfrm>
           <a:prstGeom prst="rect">
             <a:avLst/>
@@ -6200,7 +6200,7 @@
         <p:spPr>
           <a:xfrm>
             <a:off x="1707840" y="3614400"/>
-            <a:ext cx="1815480" cy="1215360"/>
+            <a:ext cx="1815120" cy="1215000"/>
           </a:xfrm>
           <a:prstGeom prst="rect">
             <a:avLst/>
@@ -6295,7 +6295,7 @@
         <p:spPr>
           <a:xfrm>
             <a:off x="3651480" y="461160"/>
-            <a:ext cx="5033880" cy="906840"/>
+            <a:ext cx="5033520" cy="906480"/>
           </a:xfrm>
           <a:prstGeom prst="rect">
             <a:avLst/>
@@ -6362,7 +6362,7 @@
         <p:spPr>
           <a:xfrm>
             <a:off x="3651480" y="1383840"/>
-            <a:ext cx="2521080" cy="1932120"/>
+            <a:ext cx="2520720" cy="1931760"/>
           </a:xfrm>
           <a:prstGeom prst="rect">
             <a:avLst/>
@@ -6491,7 +6491,7 @@
         <p:spPr>
           <a:xfrm>
             <a:off x="6326640" y="1383840"/>
-            <a:ext cx="2521080" cy="1932120"/>
+            <a:ext cx="2520720" cy="1931760"/>
           </a:xfrm>
           <a:prstGeom prst="rect">
             <a:avLst/>
@@ -6667,7 +6667,7 @@
         <p:spPr>
           <a:xfrm>
             <a:off x="3651480" y="3547800"/>
-            <a:ext cx="5195880" cy="1240560"/>
+            <a:ext cx="5195520" cy="1240200"/>
           </a:xfrm>
           <a:prstGeom prst="rect">
             <a:avLst/>
@@ -6727,7 +6727,7 @@
         <p:spPr>
           <a:xfrm>
             <a:off x="985320" y="1442160"/>
-            <a:ext cx="1664280" cy="794880"/>
+            <a:ext cx="1663920" cy="794520"/>
           </a:xfrm>
           <a:prstGeom prst="rect">
             <a:avLst/>
@@ -6788,7 +6788,7 @@
         <p:spPr>
           <a:xfrm>
             <a:off x="685800" y="659880"/>
-            <a:ext cx="2284560" cy="2336760"/>
+            <a:ext cx="2284200" cy="2336400"/>
           </a:xfrm>
           <a:prstGeom prst="rect">
             <a:avLst/>

</xml_diff>